<commit_message>
Update - add simple projectile
</commit_message>
<xml_diff>
--- a/Programming 4/08.2 NPC Collision/08.2 NPC Collision.pptx
+++ b/Programming 4/08.2 NPC Collision/08.2 NPC Collision.pptx
@@ -225,7 +225,7 @@
           <a:p>
             <a:fld id="{2B565E5C-099F-DB4B-B3D4-39EF91E5F10D}" type="datetimeFigureOut">
               <a:rPr lang="en-US" smtClean="0"/>
-              <a:t>9/18/2019</a:t>
+              <a:t>9/20/2019</a:t>
             </a:fld>
             <a:endParaRPr lang="en-US"/>
           </a:p>
@@ -3973,55 +3973,7 @@
                 <a:ea typeface="+mn-ea"/>
                 <a:cs typeface="+mn-cs"/>
               </a:rPr>
-              <a:t>This </a:t>
-            </a:r>
-            <a:r>
-              <a:rPr lang="en-NZ" sz="1200" kern="1200" dirty="0" smtClean="0">
-                <a:solidFill>
-                  <a:schemeClr val="tx1"/>
-                </a:solidFill>
-                <a:effectLst/>
-                <a:latin typeface="+mn-lt"/>
-                <a:ea typeface="+mn-ea"/>
-                <a:cs typeface="+mn-cs"/>
-              </a:rPr>
-              <a:t>computation (double for loop) </a:t>
-            </a:r>
-            <a:r>
-              <a:rPr lang="en-NZ" sz="1200" kern="1200" dirty="0" smtClean="0">
-                <a:solidFill>
-                  <a:schemeClr val="tx1"/>
-                </a:solidFill>
-                <a:effectLst/>
-                <a:latin typeface="+mn-lt"/>
-                <a:ea typeface="+mn-ea"/>
-                <a:cs typeface="+mn-cs"/>
-              </a:rPr>
-              <a:t>is O(n2</a:t>
-            </a:r>
-            <a:r>
-              <a:rPr lang="en-NZ" sz="1200" kern="1200" dirty="0" smtClean="0">
-                <a:solidFill>
-                  <a:schemeClr val="tx1"/>
-                </a:solidFill>
-                <a:effectLst/>
-                <a:latin typeface="+mn-lt"/>
-                <a:ea typeface="+mn-ea"/>
-                <a:cs typeface="+mn-cs"/>
-              </a:rPr>
-              <a:t>) in the </a:t>
-            </a:r>
-            <a:r>
-              <a:rPr lang="en-NZ" sz="1200" kern="1200" dirty="0" smtClean="0">
-                <a:solidFill>
-                  <a:schemeClr val="tx1"/>
-                </a:solidFill>
-                <a:effectLst/>
-                <a:latin typeface="+mn-lt"/>
-                <a:ea typeface="+mn-ea"/>
-                <a:cs typeface="+mn-cs"/>
-              </a:rPr>
-              <a:t>number of pixels.</a:t>
+              <a:t>This computation (double for loop) is O(n2) in the number of pixels.</a:t>
             </a:r>
             <a:r>
               <a:rPr lang="en-NZ" sz="1200" kern="1200" baseline="0" dirty="0" smtClean="0">
@@ -4045,29 +3997,8 @@
                 <a:ea typeface="+mn-ea"/>
                 <a:cs typeface="+mn-cs"/>
               </a:rPr>
-              <a:t>ut it is very </a:t>
-            </a:r>
-            <a:r>
-              <a:rPr lang="en-NZ" sz="1200" kern="1200" dirty="0" smtClean="0">
-                <a:solidFill>
-                  <a:schemeClr val="tx1"/>
-                </a:solidFill>
-                <a:effectLst/>
-                <a:latin typeface="+mn-lt"/>
-                <a:ea typeface="+mn-ea"/>
-                <a:cs typeface="+mn-cs"/>
-              </a:rPr>
-              <a:t>accurate</a:t>
-            </a:r>
-            <a:endParaRPr lang="en-NZ" sz="1200" kern="1200" dirty="0" smtClean="0">
-              <a:solidFill>
-                <a:schemeClr val="tx1"/>
-              </a:solidFill>
-              <a:effectLst/>
-              <a:latin typeface="+mn-lt"/>
-              <a:ea typeface="+mn-ea"/>
-              <a:cs typeface="+mn-cs"/>
-            </a:endParaRPr>
+              <a:t>ut it is very accurate</a:t>
+            </a:r>
           </a:p>
         </p:txBody>
       </p:sp>
@@ -4543,7 +4474,7 @@
           <a:p>
             <a:fld id="{F8166F1F-CE9B-4651-A6AA-CD717754106B}" type="datetimeFigureOut">
               <a:rPr lang="en-US" smtClean="0"/>
-              <a:t>9/18/2019</a:t>
+              <a:t>9/20/2019</a:t>
             </a:fld>
             <a:endParaRPr lang="en-US"/>
           </a:p>
@@ -4708,7 +4639,7 @@
           <a:p>
             <a:fld id="{A76116CE-C4A3-4A05-B2D7-7C2E9A889C0F}" type="datetimeFigureOut">
               <a:rPr lang="en-US" smtClean="0"/>
-              <a:t>9/18/2019</a:t>
+              <a:t>9/20/2019</a:t>
             </a:fld>
             <a:endParaRPr lang="en-US"/>
           </a:p>
@@ -4883,7 +4814,7 @@
           <a:p>
             <a:fld id="{A76116CE-C4A3-4A05-B2D7-7C2E9A889C0F}" type="datetimeFigureOut">
               <a:rPr lang="en-US" smtClean="0"/>
-              <a:t>9/18/2019</a:t>
+              <a:t>9/20/2019</a:t>
             </a:fld>
             <a:endParaRPr lang="en-US"/>
           </a:p>
@@ -5050,7 +4981,7 @@
           <a:p>
             <a:fld id="{A76116CE-C4A3-4A05-B2D7-7C2E9A889C0F}" type="datetimeFigureOut">
               <a:rPr lang="en-US" smtClean="0"/>
-              <a:t>9/18/2019</a:t>
+              <a:t>9/20/2019</a:t>
             </a:fld>
             <a:endParaRPr lang="en-US"/>
           </a:p>
@@ -5291,7 +5222,7 @@
           <a:p>
             <a:fld id="{A76116CE-C4A3-4A05-B2D7-7C2E9A889C0F}" type="datetimeFigureOut">
               <a:rPr lang="en-US" smtClean="0"/>
-              <a:t>9/18/2019</a:t>
+              <a:t>9/20/2019</a:t>
             </a:fld>
             <a:endParaRPr lang="en-US"/>
           </a:p>
@@ -5574,7 +5505,7 @@
           <a:p>
             <a:fld id="{A76116CE-C4A3-4A05-B2D7-7C2E9A889C0F}" type="datetimeFigureOut">
               <a:rPr lang="en-US" smtClean="0"/>
-              <a:t>9/18/2019</a:t>
+              <a:t>9/20/2019</a:t>
             </a:fld>
             <a:endParaRPr lang="en-US"/>
           </a:p>
@@ -5991,7 +5922,7 @@
           <a:p>
             <a:fld id="{A76116CE-C4A3-4A05-B2D7-7C2E9A889C0F}" type="datetimeFigureOut">
               <a:rPr lang="en-US" smtClean="0"/>
-              <a:t>9/18/2019</a:t>
+              <a:t>9/20/2019</a:t>
             </a:fld>
             <a:endParaRPr lang="en-US"/>
           </a:p>
@@ -6104,7 +6035,7 @@
           <a:p>
             <a:fld id="{A76116CE-C4A3-4A05-B2D7-7C2E9A889C0F}" type="datetimeFigureOut">
               <a:rPr lang="en-US" smtClean="0"/>
-              <a:t>9/18/2019</a:t>
+              <a:t>9/20/2019</a:t>
             </a:fld>
             <a:endParaRPr lang="en-US"/>
           </a:p>
@@ -6194,7 +6125,7 @@
           <a:p>
             <a:fld id="{A76116CE-C4A3-4A05-B2D7-7C2E9A889C0F}" type="datetimeFigureOut">
               <a:rPr lang="en-US" smtClean="0"/>
-              <a:t>9/18/2019</a:t>
+              <a:t>9/20/2019</a:t>
             </a:fld>
             <a:endParaRPr lang="en-US"/>
           </a:p>
@@ -6466,7 +6397,7 @@
           <a:p>
             <a:fld id="{A76116CE-C4A3-4A05-B2D7-7C2E9A889C0F}" type="datetimeFigureOut">
               <a:rPr lang="en-US" smtClean="0"/>
-              <a:t>9/18/2019</a:t>
+              <a:t>9/20/2019</a:t>
             </a:fld>
             <a:endParaRPr lang="en-US"/>
           </a:p>
@@ -6714,7 +6645,7 @@
           <a:p>
             <a:fld id="{A76116CE-C4A3-4A05-B2D7-7C2E9A889C0F}" type="datetimeFigureOut">
               <a:rPr lang="en-US" smtClean="0"/>
-              <a:t>9/18/2019</a:t>
+              <a:t>9/20/2019</a:t>
             </a:fld>
             <a:endParaRPr lang="en-US"/>
           </a:p>
@@ -6922,7 +6853,7 @@
           <a:p>
             <a:fld id="{F8166F1F-CE9B-4651-A6AA-CD717754106B}" type="datetimeFigureOut">
               <a:rPr lang="en-US" smtClean="0"/>
-              <a:t>9/18/2019</a:t>
+              <a:t>9/20/2019</a:t>
             </a:fld>
             <a:endParaRPr lang="en-US"/>
           </a:p>
@@ -9919,11 +9850,7 @@
             <a:pPr lvl="1"/>
             <a:r>
               <a:rPr lang="en-AU" sz="3500" b="1" dirty="0" smtClean="0"/>
-              <a:t>Before vs</a:t>
-            </a:r>
-            <a:r>
-              <a:rPr lang="en-AU" sz="3500" b="1" dirty="0" smtClean="0"/>
-              <a:t>. </a:t>
+              <a:t>Before vs. </a:t>
             </a:r>
             <a:r>
               <a:rPr lang="en-NZ" sz="3500" b="1" dirty="0" smtClean="0"/>
@@ -9947,7 +9874,6 @@
               <a:rPr lang="en-US" sz="2500" dirty="0" smtClean="0"/>
               <a:t>Before</a:t>
             </a:r>
-            <a:endParaRPr lang="en-US" sz="2500" dirty="0" smtClean="0"/>
           </a:p>
           <a:p>
             <a:pPr marL="2114550" lvl="3" indent="-742950">
@@ -9985,8 +9911,8 @@
               <a:buChar char="•"/>
             </a:pPr>
             <a:r>
-              <a:rPr lang="en-US" sz="2500" smtClean="0"/>
-              <a:t>A posteriori</a:t>
+              <a:rPr lang="en-US" sz="2500" dirty="0" smtClean="0"/>
+              <a:t>After</a:t>
             </a:r>
             <a:endParaRPr lang="en-US" sz="2500" dirty="0" smtClean="0"/>
           </a:p>

</xml_diff>